<commit_message>
Add portuguese version of post
</commit_message>
<xml_diff>
--- a/posts/2023/2023-08-31-data-decisions/flow.pptx
+++ b/posts/2023/2023-08-31-data-decisions/flow.pptx
@@ -7,6 +7,7 @@
   <p:sldIdLst>
     <p:sldId id="256" r:id="rId3"/>
     <p:sldId id="257" r:id="rId4"/>
+    <p:sldId id="258" r:id="rId5"/>
   </p:sldIdLst>
   <p:sldSz cx="14400213" cy="4319588"/>
   <p:notesSz cx="7559675" cy="10691813"/>
@@ -64,7 +65,7 @@
         <p:txBody>
           <a:bodyPr/>
           <a:p>
-            <a:fld id="{BA1368EE-F7CB-47EF-B36E-9B2AF80B7B4B}" type="slidenum">
+            <a:fld id="{F053FDE4-84C8-41AD-BE1A-11451A7867C0}" type="slidenum">
               <a:t>&lt;#&gt;</a:t>
             </a:fld>
           </a:p>
@@ -273,7 +274,7 @@
         <p:txBody>
           <a:bodyPr/>
           <a:p>
-            <a:fld id="{04B287CD-193A-459D-9C80-2E55C228CB84}" type="slidenum">
+            <a:fld id="{065FA6E7-D186-4D74-82E7-63C1616E3909}" type="slidenum">
               <a:t>&lt;#&gt;</a:t>
             </a:fld>
           </a:p>
@@ -568,7 +569,7 @@
         <p:txBody>
           <a:bodyPr/>
           <a:p>
-            <a:fld id="{BD357A86-2E19-4A9B-B7FE-0BC802F7A9B6}" type="slidenum">
+            <a:fld id="{7BBD1F86-A3A2-4C6A-86D3-73E1CCC3F251}" type="slidenum">
               <a:t>&lt;#&gt;</a:t>
             </a:fld>
           </a:p>
@@ -949,7 +950,7 @@
         <p:txBody>
           <a:bodyPr/>
           <a:p>
-            <a:fld id="{88B9FA18-0D47-4F0B-BBE2-2F26BD973DF1}" type="slidenum">
+            <a:fld id="{400F5C69-BDAA-4629-95EF-3481DD06DA34}" type="slidenum">
               <a:t>&lt;#&gt;</a:t>
             </a:fld>
           </a:p>
@@ -1112,7 +1113,7 @@
         <p:txBody>
           <a:bodyPr/>
           <a:p>
-            <a:fld id="{6A875D95-F110-49D6-86A1-68846E7FBA6E}" type="slidenum">
+            <a:fld id="{23AFED4A-CEBC-4D61-A188-DA087EB5B396}" type="slidenum">
               <a:t>&lt;#&gt;</a:t>
             </a:fld>
           </a:p>
@@ -1278,7 +1279,7 @@
         <p:txBody>
           <a:bodyPr/>
           <a:p>
-            <a:fld id="{46AE6CC7-EB3F-4D8B-9C5A-DFC415CA3221}" type="slidenum">
+            <a:fld id="{56DFA4A0-BBA5-438B-BD84-D63B0946BED9}" type="slidenum">
               <a:t>&lt;#&gt;</a:t>
             </a:fld>
           </a:p>
@@ -1487,7 +1488,7 @@
         <p:txBody>
           <a:bodyPr/>
           <a:p>
-            <a:fld id="{000C28F7-7824-456E-AF83-1A55F0D34394}" type="slidenum">
+            <a:fld id="{7947BB23-0156-4FB0-870D-3387C6A8DDF6}" type="slidenum">
               <a:t>&lt;#&gt;</a:t>
             </a:fld>
           </a:p>
@@ -1610,7 +1611,7 @@
         <p:txBody>
           <a:bodyPr/>
           <a:p>
-            <a:fld id="{6F033732-794E-4ED1-905A-E48DC9BF86EC}" type="slidenum">
+            <a:fld id="{7E620FE9-4763-448D-8FDA-6051108C81A8}" type="slidenum">
               <a:t>&lt;#&gt;</a:t>
             </a:fld>
           </a:p>
@@ -1731,7 +1732,7 @@
         <p:txBody>
           <a:bodyPr/>
           <a:p>
-            <a:fld id="{93293068-6876-4350-96B2-96D4D6E88286}" type="slidenum">
+            <a:fld id="{014C351A-3EB3-4482-B610-44EC27226785}" type="slidenum">
               <a:t>&lt;#&gt;</a:t>
             </a:fld>
           </a:p>
@@ -1983,7 +1984,7 @@
         <p:txBody>
           <a:bodyPr/>
           <a:p>
-            <a:fld id="{6500B7B1-6616-4A8D-BE98-21A2A5485670}" type="slidenum">
+            <a:fld id="{62D046F5-55E1-48F5-A5D4-2FE53E1B942F}" type="slidenum">
               <a:t>&lt;#&gt;</a:t>
             </a:fld>
           </a:p>
@@ -2235,7 +2236,7 @@
         <p:txBody>
           <a:bodyPr/>
           <a:p>
-            <a:fld id="{7D9C184B-D9D9-4C75-814F-F1AD2BD8BDB9}" type="slidenum">
+            <a:fld id="{A912FDE4-02DB-426E-823F-7FEC4E116496}" type="slidenum">
               <a:t>&lt;#&gt;</a:t>
             </a:fld>
           </a:p>
@@ -2487,7 +2488,7 @@
         <p:txBody>
           <a:bodyPr/>
           <a:p>
-            <a:fld id="{058EEDEC-6C88-40F0-9E25-985C8EC957FA}" type="slidenum">
+            <a:fld id="{D08B777D-A2CB-42E6-B426-9800555D1E28}" type="slidenum">
               <a:t>&lt;#&gt;</a:t>
             </a:fld>
           </a:p>
@@ -2549,7 +2550,7 @@
         <p:spPr>
           <a:xfrm>
             <a:off x="4308840" y="5164560"/>
-            <a:ext cx="3992400" cy="389520"/>
+            <a:ext cx="3992040" cy="389160"/>
           </a:xfrm>
           <a:prstGeom prst="rect">
             <a:avLst/>
@@ -2597,7 +2598,7 @@
                 </a:solidFill>
                 <a:latin typeface="Times New Roman"/>
               </a:rPr>
-              <a:t> </a:t>
+              <a:t>&lt;rodapé&gt;</a:t>
             </a:r>
             <a:endParaRPr b="0" lang="pt-BR" sz="1400" spc="-1" strike="noStrike">
               <a:solidFill>
@@ -2621,7 +2622,7 @@
         <p:spPr>
           <a:xfrm>
             <a:off x="9033480" y="5164560"/>
-            <a:ext cx="2934000" cy="389520"/>
+            <a:ext cx="2933640" cy="389160"/>
           </a:xfrm>
           <a:prstGeom prst="rect">
             <a:avLst/>
@@ -2662,14 +2663,14 @@
                 <a:tab algn="l" pos="0"/>
               </a:tabLst>
             </a:pPr>
-            <a:fld id="{9AD60EC3-213F-4BC8-9493-33CA53FC5B91}" type="slidenum">
+            <a:fld id="{C9500031-D748-430F-8FA9-1B50F6C46CE3}" type="slidenum">
               <a:rPr b="0" lang="pt-BR" sz="1400" spc="-1" strike="noStrike">
                 <a:solidFill>
                   <a:srgbClr val="000000"/>
                 </a:solidFill>
                 <a:latin typeface="Times New Roman"/>
               </a:rPr>
-              <a:t>2</a:t>
+              <a:t>&lt;número&gt;</a:t>
             </a:fld>
             <a:endParaRPr b="0" lang="pt-BR" sz="1400" spc="-1" strike="noStrike">
               <a:solidFill>
@@ -2693,7 +2694,7 @@
         <p:spPr>
           <a:xfrm>
             <a:off x="629640" y="5164560"/>
-            <a:ext cx="2934000" cy="389520"/>
+            <a:ext cx="2933640" cy="389160"/>
           </a:xfrm>
           <a:prstGeom prst="rect">
             <a:avLst/>
@@ -2729,7 +2730,7 @@
                 </a:solidFill>
                 <a:latin typeface="Times New Roman"/>
               </a:rPr>
-              <a:t> </a:t>
+              <a:t>&lt;data/hora&gt;</a:t>
             </a:r>
             <a:endParaRPr b="0" lang="pt-BR" sz="1400" spc="-1" strike="noStrike">
               <a:solidFill>
@@ -3060,7 +3061,7 @@
         <p:spPr>
           <a:xfrm>
             <a:off x="2024640" y="1197360"/>
-            <a:ext cx="3373560" cy="601200"/>
+            <a:ext cx="3373200" cy="600840"/>
           </a:xfrm>
           <a:prstGeom prst="rect">
             <a:avLst/>
@@ -3118,7 +3119,7 @@
         <p:spPr>
           <a:xfrm>
             <a:off x="3239280" y="477360"/>
-            <a:ext cx="809280" cy="647280"/>
+            <a:ext cx="808920" cy="646920"/>
           </a:xfrm>
           <a:prstGeom prst="rect">
             <a:avLst/>
@@ -3137,7 +3138,7 @@
         <p:spPr>
           <a:xfrm>
             <a:off x="3059640" y="81360"/>
-            <a:ext cx="1123920" cy="358920"/>
+            <a:ext cx="1123560" cy="358560"/>
           </a:xfrm>
           <a:prstGeom prst="rect">
             <a:avLst/>
@@ -3238,7 +3239,7 @@
         <p:spPr>
           <a:xfrm>
             <a:off x="6928920" y="503640"/>
-            <a:ext cx="809280" cy="647280"/>
+            <a:ext cx="808920" cy="646920"/>
           </a:xfrm>
           <a:prstGeom prst="rect">
             <a:avLst/>
@@ -3257,7 +3258,7 @@
         <p:spPr>
           <a:xfrm>
             <a:off x="6749280" y="107640"/>
-            <a:ext cx="1123920" cy="358920"/>
+            <a:ext cx="1123560" cy="358560"/>
           </a:xfrm>
           <a:prstGeom prst="rect">
             <a:avLst/>
@@ -3311,7 +3312,7 @@
         <p:spPr>
           <a:xfrm>
             <a:off x="5669280" y="1197720"/>
-            <a:ext cx="3373560" cy="601200"/>
+            <a:ext cx="3373200" cy="600840"/>
           </a:xfrm>
           <a:prstGeom prst="rect">
             <a:avLst/>
@@ -3408,7 +3409,7 @@
         <p:spPr>
           <a:xfrm>
             <a:off x="2474640" y="4175280"/>
-            <a:ext cx="4048560" cy="1258920"/>
+            <a:ext cx="4048200" cy="1258560"/>
           </a:xfrm>
           <a:prstGeom prst="rect">
             <a:avLst/>
@@ -3462,7 +3463,7 @@
         <p:spPr>
           <a:xfrm>
             <a:off x="4994280" y="2771640"/>
-            <a:ext cx="898920" cy="421200"/>
+            <a:ext cx="898560" cy="420840"/>
           </a:xfrm>
           <a:prstGeom prst="rect">
             <a:avLst/>
@@ -3602,7 +3603,7 @@
         <p:spPr>
           <a:xfrm>
             <a:off x="7629480" y="2771640"/>
-            <a:ext cx="898920" cy="421200"/>
+            <a:ext cx="898560" cy="420840"/>
           </a:xfrm>
           <a:prstGeom prst="rect">
             <a:avLst/>
@@ -3699,7 +3700,7 @@
         <p:spPr>
           <a:xfrm>
             <a:off x="7694280" y="4175280"/>
-            <a:ext cx="4048560" cy="1258920"/>
+            <a:ext cx="4048200" cy="1258560"/>
           </a:xfrm>
           <a:prstGeom prst="rect">
             <a:avLst/>
@@ -3783,7 +3784,7 @@
         <p:spPr>
           <a:xfrm>
             <a:off x="224640" y="1269720"/>
-            <a:ext cx="1574640" cy="1141560"/>
+            <a:ext cx="1574280" cy="1141200"/>
           </a:xfrm>
           <a:prstGeom prst="rect">
             <a:avLst/>
@@ -3841,7 +3842,7 @@
         <p:spPr>
           <a:xfrm>
             <a:off x="629640" y="467640"/>
-            <a:ext cx="629640" cy="647280"/>
+            <a:ext cx="629280" cy="646920"/>
           </a:xfrm>
           <a:prstGeom prst="rect">
             <a:avLst/>
@@ -3860,7 +3861,7 @@
         <p:spPr>
           <a:xfrm>
             <a:off x="378000" y="35640"/>
-            <a:ext cx="1123920" cy="358920"/>
+            <a:ext cx="1123560" cy="358560"/>
           </a:xfrm>
           <a:prstGeom prst="rect">
             <a:avLst/>
@@ -3957,7 +3958,7 @@
         <p:spPr>
           <a:xfrm>
             <a:off x="10440000" y="396000"/>
-            <a:ext cx="2159280" cy="781560"/>
+            <a:ext cx="2158920" cy="781200"/>
           </a:xfrm>
           <a:prstGeom prst="rect">
             <a:avLst/>
@@ -4054,7 +4055,7 @@
         <p:spPr>
           <a:xfrm>
             <a:off x="10260000" y="3060000"/>
-            <a:ext cx="3220560" cy="1258920"/>
+            <a:ext cx="3220200" cy="1258560"/>
           </a:xfrm>
           <a:prstGeom prst="rect">
             <a:avLst/>
@@ -4108,7 +4109,7 @@
         <p:spPr>
           <a:xfrm>
             <a:off x="11510280" y="1835640"/>
-            <a:ext cx="898920" cy="421200"/>
+            <a:ext cx="898560" cy="420840"/>
           </a:xfrm>
           <a:prstGeom prst="rect">
             <a:avLst/>
@@ -4205,7 +4206,7 @@
         <p:spPr>
           <a:xfrm>
             <a:off x="2268000" y="432000"/>
-            <a:ext cx="1214640" cy="719280"/>
+            <a:ext cx="1214280" cy="718920"/>
           </a:xfrm>
           <a:prstGeom prst="rect">
             <a:avLst/>
@@ -4302,7 +4303,7 @@
         <p:spPr>
           <a:xfrm>
             <a:off x="4184640" y="432000"/>
-            <a:ext cx="1214640" cy="719280"/>
+            <a:ext cx="1214280" cy="718920"/>
           </a:xfrm>
           <a:prstGeom prst="rect">
             <a:avLst/>
@@ -4442,7 +4443,7 @@
         <p:spPr>
           <a:xfrm>
             <a:off x="6056640" y="432000"/>
-            <a:ext cx="1214640" cy="719280"/>
+            <a:ext cx="1214280" cy="718920"/>
           </a:xfrm>
           <a:prstGeom prst="rect">
             <a:avLst/>
@@ -4582,7 +4583,7 @@
         <p:spPr>
           <a:xfrm>
             <a:off x="7992000" y="432000"/>
-            <a:ext cx="1214640" cy="719280"/>
+            <a:ext cx="1214280" cy="718920"/>
           </a:xfrm>
           <a:prstGeom prst="rect">
             <a:avLst/>
@@ -4617,6 +4618,899 @@
                 <a:ea typeface="DejaVu Sans"/>
               </a:rPr>
               <a:t>Do you have a car?</a:t>
+            </a:r>
+            <a:endParaRPr b="0" lang="pt-BR" sz="1500" spc="-1" strike="noStrike">
+              <a:solidFill>
+                <a:srgbClr val="000000"/>
+              </a:solidFill>
+              <a:latin typeface="Arial"/>
+            </a:endParaRPr>
+          </a:p>
+        </p:txBody>
+      </p:sp>
+    </p:spTree>
+  </p:cSld>
+  <mc:AlternateContent>
+    <mc:Choice Requires="p14">
+      <p:transition spd="slow" p14:dur="2000"/>
+    </mc:Choice>
+    <mc:Fallback>
+      <p:transition spd="slow"/>
+    </mc:Fallback>
+  </mc:AlternateContent>
+</p:sld>
+</file>
+
+<file path=ppt/slides/slide3.xml><?xml version="1.0" encoding="utf-8"?>
+<p:sld xmlns:a="http://schemas.openxmlformats.org/drawingml/2006/main" xmlns:p="http://schemas.openxmlformats.org/presentationml/2006/main" xmlns:r="http://schemas.openxmlformats.org/officeDocument/2006/relationships" xmlns:p14="http://schemas.microsoft.com/office/powerpoint/2010/main" xmlns:p15="http://schemas.microsoft.com/office/powerpoint/2012/main" xmlns:mc="http://schemas.openxmlformats.org/markup-compatibility/2006">
+  <p:cSld>
+    <p:spTree>
+      <p:nvGrpSpPr>
+        <p:cNvPr id="1" name=""/>
+        <p:cNvGrpSpPr/>
+        <p:nvPr/>
+      </p:nvGrpSpPr>
+      <p:grpSpPr>
+        <a:xfrm>
+          <a:off x="0" y="0"/>
+          <a:ext cx="0" cy="0"/>
+          <a:chOff x="0" y="0"/>
+          <a:chExt cx="0" cy="0"/>
+        </a:xfrm>
+      </p:grpSpPr>
+      <p:sp>
+        <p:nvSpPr>
+          <p:cNvPr id="74" name=""/>
+          <p:cNvSpPr/>
+          <p:nvPr/>
+        </p:nvSpPr>
+        <p:spPr>
+          <a:xfrm>
+            <a:off x="224640" y="1269720"/>
+            <a:ext cx="1574280" cy="1141200"/>
+          </a:xfrm>
+          <a:prstGeom prst="rect">
+            <a:avLst/>
+          </a:prstGeom>
+          <a:noFill/>
+          <a:ln w="0">
+            <a:noFill/>
+          </a:ln>
+        </p:spPr>
+        <p:style>
+          <a:lnRef idx="0"/>
+          <a:fillRef idx="0"/>
+          <a:effectRef idx="0"/>
+          <a:fontRef idx="minor"/>
+        </p:style>
+        <p:txBody>
+          <a:bodyPr lIns="90000" rIns="90000" tIns="45000" bIns="45000" anchor="t">
+            <a:noAutofit/>
+          </a:bodyPr>
+          <a:p>
+            <a:pPr>
+              <a:lnSpc>
+                <a:spcPct val="100000"/>
+              </a:lnSpc>
+            </a:pPr>
+            <a:r>
+              <a:rPr b="0" lang="pt-BR" sz="1500" spc="-1" strike="noStrike">
+                <a:solidFill>
+                  <a:srgbClr val="000000"/>
+                </a:solidFill>
+                <a:latin typeface="Arial"/>
+                <a:ea typeface="DejaVu Sans"/>
+              </a:rPr>
+              <a:t>Olá! Quero adquirir um empréstimo por favor 💵</a:t>
+            </a:r>
+            <a:endParaRPr b="0" lang="pt-BR" sz="1500" spc="-1" strike="noStrike">
+              <a:solidFill>
+                <a:srgbClr val="000000"/>
+              </a:solidFill>
+              <a:latin typeface="Arial"/>
+            </a:endParaRPr>
+          </a:p>
+        </p:txBody>
+      </p:sp>
+      <p:pic>
+        <p:nvPicPr>
+          <p:cNvPr id="75" name="" descr=""/>
+          <p:cNvPicPr/>
+          <p:nvPr/>
+        </p:nvPicPr>
+        <p:blipFill>
+          <a:blip r:embed="rId1"/>
+          <a:stretch/>
+        </p:blipFill>
+        <p:spPr>
+          <a:xfrm>
+            <a:off x="629640" y="467640"/>
+            <a:ext cx="629280" cy="646920"/>
+          </a:xfrm>
+          <a:prstGeom prst="rect">
+            <a:avLst/>
+          </a:prstGeom>
+          <a:ln w="0">
+            <a:noFill/>
+          </a:ln>
+        </p:spPr>
+      </p:pic>
+      <p:sp>
+        <p:nvSpPr>
+          <p:cNvPr id="76" name=""/>
+          <p:cNvSpPr/>
+          <p:nvPr/>
+        </p:nvSpPr>
+        <p:spPr>
+          <a:xfrm>
+            <a:off x="378000" y="35640"/>
+            <a:ext cx="1123560" cy="358560"/>
+          </a:xfrm>
+          <a:prstGeom prst="rect">
+            <a:avLst/>
+          </a:prstGeom>
+          <a:noFill/>
+          <a:ln w="0">
+            <a:noFill/>
+          </a:ln>
+        </p:spPr>
+        <p:style>
+          <a:lnRef idx="0"/>
+          <a:fillRef idx="0"/>
+          <a:effectRef idx="0"/>
+          <a:fontRef idx="minor"/>
+        </p:style>
+        <p:txBody>
+          <a:bodyPr lIns="90000" rIns="90000" tIns="45000" bIns="45000" anchor="ctr">
+            <a:noAutofit/>
+          </a:bodyPr>
+          <a:p>
+            <a:pPr algn="ctr">
+              <a:lnSpc>
+                <a:spcPct val="100000"/>
+              </a:lnSpc>
+            </a:pPr>
+            <a:r>
+              <a:rPr b="1" lang="pt-BR" sz="1800" spc="-1" strike="noStrike">
+                <a:solidFill>
+                  <a:srgbClr val="000000"/>
+                </a:solidFill>
+                <a:latin typeface="Arial"/>
+                <a:ea typeface="DejaVu Sans"/>
+              </a:rPr>
+              <a:t>Usuário</a:t>
+            </a:r>
+            <a:endParaRPr b="0" lang="pt-BR" sz="1800" spc="-1" strike="noStrike">
+              <a:solidFill>
+                <a:srgbClr val="000000"/>
+              </a:solidFill>
+              <a:latin typeface="Arial"/>
+            </a:endParaRPr>
+          </a:p>
+        </p:txBody>
+      </p:sp>
+      <p:sp>
+        <p:nvSpPr>
+          <p:cNvPr id="77" name=""/>
+          <p:cNvSpPr/>
+          <p:nvPr/>
+        </p:nvSpPr>
+        <p:spPr>
+          <a:xfrm>
+            <a:off x="1440000" y="792000"/>
+            <a:ext cx="720000" cy="360"/>
+          </a:xfrm>
+          <a:prstGeom prst="line">
+            <a:avLst/>
+          </a:prstGeom>
+          <a:ln w="108000">
+            <a:solidFill>
+              <a:srgbClr val="3465a4"/>
+            </a:solidFill>
+            <a:round/>
+            <a:tailEnd len="med" type="triangle" w="med"/>
+          </a:ln>
+        </p:spPr>
+        <p:style>
+          <a:lnRef idx="0"/>
+          <a:fillRef idx="0"/>
+          <a:effectRef idx="0"/>
+          <a:fontRef idx="minor"/>
+        </p:style>
+        <p:txBody>
+          <a:bodyPr lIns="144000" rIns="144000" tIns="-99000" bIns="-99000" anchor="ctr">
+            <a:noAutofit/>
+          </a:bodyPr>
+          <a:p>
+            <a:endParaRPr b="0" lang="pt-BR" sz="1800" spc="-1" strike="noStrike">
+              <a:solidFill>
+                <a:srgbClr val="000000"/>
+              </a:solidFill>
+              <a:latin typeface="Arial"/>
+              <a:ea typeface="DejaVu Sans"/>
+            </a:endParaRPr>
+          </a:p>
+        </p:txBody>
+      </p:sp>
+      <p:sp>
+        <p:nvSpPr>
+          <p:cNvPr id="78" name=""/>
+          <p:cNvSpPr/>
+          <p:nvPr/>
+        </p:nvSpPr>
+        <p:spPr>
+          <a:xfrm>
+            <a:off x="10440000" y="396000"/>
+            <a:ext cx="2158920" cy="781200"/>
+          </a:xfrm>
+          <a:prstGeom prst="rect">
+            <a:avLst/>
+          </a:prstGeom>
+          <a:noFill/>
+          <a:ln w="0">
+            <a:noFill/>
+          </a:ln>
+        </p:spPr>
+        <p:style>
+          <a:lnRef idx="0"/>
+          <a:fillRef idx="0"/>
+          <a:effectRef idx="0"/>
+          <a:fontRef idx="minor"/>
+        </p:style>
+        <p:txBody>
+          <a:bodyPr lIns="90000" rIns="90000" tIns="45000" bIns="45000" anchor="t">
+            <a:noAutofit/>
+          </a:bodyPr>
+          <a:p>
+            <a:pPr>
+              <a:lnSpc>
+                <a:spcPct val="100000"/>
+              </a:lnSpc>
+            </a:pPr>
+            <a:r>
+              <a:rPr b="0" lang="pt-BR" sz="1500" spc="-1" strike="noStrike">
+                <a:solidFill>
+                  <a:srgbClr val="000000"/>
+                </a:solidFill>
+                <a:latin typeface="Arial"/>
+                <a:ea typeface="DejaVu Sans"/>
+              </a:rPr>
+              <a:t>Você é elegível às três modalidades de empréstimo ?</a:t>
+            </a:r>
+            <a:endParaRPr b="0" lang="pt-BR" sz="1500" spc="-1" strike="noStrike">
+              <a:solidFill>
+                <a:srgbClr val="000000"/>
+              </a:solidFill>
+              <a:latin typeface="Arial"/>
+            </a:endParaRPr>
+          </a:p>
+        </p:txBody>
+      </p:sp>
+      <p:sp>
+        <p:nvSpPr>
+          <p:cNvPr id="79" name=""/>
+          <p:cNvSpPr/>
+          <p:nvPr/>
+        </p:nvSpPr>
+        <p:spPr>
+          <a:xfrm>
+            <a:off x="11969280" y="1187640"/>
+            <a:ext cx="360" cy="684360"/>
+          </a:xfrm>
+          <a:prstGeom prst="line">
+            <a:avLst/>
+          </a:prstGeom>
+          <a:ln w="108000">
+            <a:solidFill>
+              <a:srgbClr val="3465a4"/>
+            </a:solidFill>
+            <a:round/>
+            <a:tailEnd len="med" type="triangle" w="med"/>
+          </a:ln>
+        </p:spPr>
+        <p:style>
+          <a:lnRef idx="0"/>
+          <a:fillRef idx="0"/>
+          <a:effectRef idx="0"/>
+          <a:fontRef idx="minor"/>
+        </p:style>
+        <p:txBody>
+          <a:bodyPr lIns="144000" rIns="144000" tIns="99000" bIns="99000" anchor="ctr">
+            <a:noAutofit/>
+          </a:bodyPr>
+          <a:p>
+            <a:endParaRPr b="0" lang="pt-BR" sz="1800" spc="-1" strike="noStrike">
+              <a:solidFill>
+                <a:srgbClr val="000000"/>
+              </a:solidFill>
+              <a:latin typeface="Arial"/>
+              <a:ea typeface="DejaVu Sans"/>
+            </a:endParaRPr>
+          </a:p>
+        </p:txBody>
+      </p:sp>
+      <p:sp>
+        <p:nvSpPr>
+          <p:cNvPr id="80" name=""/>
+          <p:cNvSpPr/>
+          <p:nvPr/>
+        </p:nvSpPr>
+        <p:spPr>
+          <a:xfrm>
+            <a:off x="10260000" y="3060000"/>
+            <a:ext cx="3220200" cy="1258560"/>
+          </a:xfrm>
+          <a:prstGeom prst="rect">
+            <a:avLst/>
+          </a:prstGeom>
+          <a:noFill/>
+          <a:ln w="0">
+            <a:noFill/>
+          </a:ln>
+        </p:spPr>
+        <p:style>
+          <a:lnRef idx="0"/>
+          <a:fillRef idx="0"/>
+          <a:effectRef idx="0"/>
+          <a:fontRef idx="minor"/>
+        </p:style>
+        <p:txBody>
+          <a:bodyPr lIns="90000" rIns="90000" tIns="45000" bIns="45000" anchor="t">
+            <a:noAutofit/>
+          </a:bodyPr>
+          <a:p>
+            <a:pPr>
+              <a:lnSpc>
+                <a:spcPct val="100000"/>
+              </a:lnSpc>
+            </a:pPr>
+            <a:r>
+              <a:rPr b="0" lang="pt-BR" sz="1500" spc="-1" strike="noStrike">
+                <a:solidFill>
+                  <a:srgbClr val="000000"/>
+                </a:solidFill>
+                <a:latin typeface="Arial"/>
+                <a:ea typeface="DejaVu Sans"/>
+              </a:rPr>
+              <a:t>Me desculpe, porém este empréstimo só está disponível para clientes que são elegíveis </a:t>
+            </a:r>
+            <a:r>
+              <a:rPr b="0" lang="pt-BR" sz="1500" spc="-1" strike="noStrike">
+                <a:solidFill>
+                  <a:srgbClr val="000000"/>
+                </a:solidFill>
+                <a:latin typeface="Arial"/>
+                <a:ea typeface="DejaVu Sans"/>
+              </a:rPr>
+              <a:t>às três modalidades. Posso te ajudar com algo mais?</a:t>
+            </a:r>
+            <a:endParaRPr b="0" lang="pt-BR" sz="1500" spc="-1" strike="noStrike">
+              <a:solidFill>
+                <a:srgbClr val="000000"/>
+              </a:solidFill>
+              <a:latin typeface="Arial"/>
+            </a:endParaRPr>
+          </a:p>
+        </p:txBody>
+      </p:sp>
+      <p:sp>
+        <p:nvSpPr>
+          <p:cNvPr id="81" name=""/>
+          <p:cNvSpPr/>
+          <p:nvPr/>
+        </p:nvSpPr>
+        <p:spPr>
+          <a:xfrm>
+            <a:off x="11510280" y="1835640"/>
+            <a:ext cx="898560" cy="420840"/>
+          </a:xfrm>
+          <a:prstGeom prst="rect">
+            <a:avLst/>
+          </a:prstGeom>
+          <a:noFill/>
+          <a:ln w="0">
+            <a:noFill/>
+          </a:ln>
+        </p:spPr>
+        <p:style>
+          <a:lnRef idx="0"/>
+          <a:fillRef idx="0"/>
+          <a:effectRef idx="0"/>
+          <a:fontRef idx="minor"/>
+        </p:style>
+        <p:txBody>
+          <a:bodyPr lIns="90000" rIns="90000" tIns="45000" bIns="45000" anchor="ctr">
+            <a:noAutofit/>
+          </a:bodyPr>
+          <a:p>
+            <a:pPr algn="ctr">
+              <a:lnSpc>
+                <a:spcPct val="100000"/>
+              </a:lnSpc>
+            </a:pPr>
+            <a:r>
+              <a:rPr b="1" lang="pt-BR" sz="1800" spc="-1" strike="noStrike">
+                <a:solidFill>
+                  <a:srgbClr val="000000"/>
+                </a:solidFill>
+                <a:latin typeface="Arial"/>
+                <a:ea typeface="DejaVu Sans"/>
+              </a:rPr>
+              <a:t>Não</a:t>
+            </a:r>
+            <a:endParaRPr b="0" lang="pt-BR" sz="1800" spc="-1" strike="noStrike">
+              <a:solidFill>
+                <a:srgbClr val="000000"/>
+              </a:solidFill>
+              <a:latin typeface="Arial"/>
+            </a:endParaRPr>
+          </a:p>
+        </p:txBody>
+      </p:sp>
+      <p:sp>
+        <p:nvSpPr>
+          <p:cNvPr id="82" name=""/>
+          <p:cNvSpPr/>
+          <p:nvPr/>
+        </p:nvSpPr>
+        <p:spPr>
+          <a:xfrm>
+            <a:off x="12681000" y="756000"/>
+            <a:ext cx="675000" cy="360"/>
+          </a:xfrm>
+          <a:prstGeom prst="line">
+            <a:avLst/>
+          </a:prstGeom>
+          <a:ln w="108000">
+            <a:solidFill>
+              <a:srgbClr val="3465a4"/>
+            </a:solidFill>
+            <a:round/>
+            <a:tailEnd len="med" type="triangle" w="med"/>
+          </a:ln>
+        </p:spPr>
+        <p:style>
+          <a:lnRef idx="0"/>
+          <a:fillRef idx="0"/>
+          <a:effectRef idx="0"/>
+          <a:fontRef idx="minor"/>
+        </p:style>
+        <p:txBody>
+          <a:bodyPr lIns="144000" rIns="144000" tIns="-99000" bIns="-99000" anchor="ctr">
+            <a:noAutofit/>
+          </a:bodyPr>
+          <a:p>
+            <a:endParaRPr b="0" lang="pt-BR" sz="1800" spc="-1" strike="noStrike">
+              <a:solidFill>
+                <a:srgbClr val="000000"/>
+              </a:solidFill>
+              <a:latin typeface="Arial"/>
+              <a:ea typeface="DejaVu Sans"/>
+            </a:endParaRPr>
+          </a:p>
+        </p:txBody>
+      </p:sp>
+      <p:sp>
+        <p:nvSpPr>
+          <p:cNvPr id="83" name=""/>
+          <p:cNvSpPr/>
+          <p:nvPr/>
+        </p:nvSpPr>
+        <p:spPr>
+          <a:xfrm>
+            <a:off x="2268000" y="432000"/>
+            <a:ext cx="1214280" cy="718920"/>
+          </a:xfrm>
+          <a:prstGeom prst="rect">
+            <a:avLst/>
+          </a:prstGeom>
+          <a:noFill/>
+          <a:ln w="0">
+            <a:noFill/>
+          </a:ln>
+        </p:spPr>
+        <p:style>
+          <a:lnRef idx="0"/>
+          <a:fillRef idx="0"/>
+          <a:effectRef idx="0"/>
+          <a:fontRef idx="minor"/>
+        </p:style>
+        <p:txBody>
+          <a:bodyPr lIns="90000" rIns="90000" tIns="45000" bIns="45000" anchor="ctr">
+            <a:noAutofit/>
+          </a:bodyPr>
+          <a:p>
+            <a:pPr>
+              <a:lnSpc>
+                <a:spcPct val="100000"/>
+              </a:lnSpc>
+            </a:pPr>
+            <a:r>
+              <a:rPr b="0" lang="pt-BR" sz="1500" spc="-1" strike="noStrike">
+                <a:solidFill>
+                  <a:srgbClr val="000000"/>
+                </a:solidFill>
+                <a:latin typeface="Arial"/>
+                <a:ea typeface="DejaVu Sans"/>
+              </a:rPr>
+              <a:t>Qual o seu nome?</a:t>
+            </a:r>
+            <a:endParaRPr b="0" lang="pt-BR" sz="1500" spc="-1" strike="noStrike">
+              <a:solidFill>
+                <a:srgbClr val="000000"/>
+              </a:solidFill>
+              <a:latin typeface="Arial"/>
+            </a:endParaRPr>
+          </a:p>
+        </p:txBody>
+      </p:sp>
+      <p:sp>
+        <p:nvSpPr>
+          <p:cNvPr id="84" name=""/>
+          <p:cNvSpPr/>
+          <p:nvPr/>
+        </p:nvSpPr>
+        <p:spPr>
+          <a:xfrm>
+            <a:off x="3456000" y="792000"/>
+            <a:ext cx="720000" cy="360"/>
+          </a:xfrm>
+          <a:prstGeom prst="line">
+            <a:avLst/>
+          </a:prstGeom>
+          <a:ln w="108000">
+            <a:solidFill>
+              <a:srgbClr val="3465a4"/>
+            </a:solidFill>
+            <a:round/>
+            <a:tailEnd len="med" type="triangle" w="med"/>
+          </a:ln>
+        </p:spPr>
+        <p:style>
+          <a:lnRef idx="0"/>
+          <a:fillRef idx="0"/>
+          <a:effectRef idx="0"/>
+          <a:fontRef idx="minor"/>
+        </p:style>
+        <p:txBody>
+          <a:bodyPr lIns="144000" rIns="144000" tIns="-99000" bIns="-99000" anchor="ctr">
+            <a:noAutofit/>
+          </a:bodyPr>
+          <a:p>
+            <a:endParaRPr b="0" lang="pt-BR" sz="1800" spc="-1" strike="noStrike">
+              <a:solidFill>
+                <a:srgbClr val="000000"/>
+              </a:solidFill>
+              <a:latin typeface="Arial"/>
+              <a:ea typeface="DejaVu Sans"/>
+            </a:endParaRPr>
+          </a:p>
+        </p:txBody>
+      </p:sp>
+      <p:sp>
+        <p:nvSpPr>
+          <p:cNvPr id="85" name=""/>
+          <p:cNvSpPr/>
+          <p:nvPr/>
+        </p:nvSpPr>
+        <p:spPr>
+          <a:xfrm>
+            <a:off x="4184640" y="432000"/>
+            <a:ext cx="1214280" cy="718920"/>
+          </a:xfrm>
+          <a:prstGeom prst="rect">
+            <a:avLst/>
+          </a:prstGeom>
+          <a:noFill/>
+          <a:ln w="0">
+            <a:noFill/>
+          </a:ln>
+        </p:spPr>
+        <p:style>
+          <a:lnRef idx="0"/>
+          <a:fillRef idx="0"/>
+          <a:effectRef idx="0"/>
+          <a:fontRef idx="minor"/>
+        </p:style>
+        <p:txBody>
+          <a:bodyPr lIns="90000" rIns="90000" tIns="45000" bIns="45000" anchor="ctr">
+            <a:noAutofit/>
+          </a:bodyPr>
+          <a:p>
+            <a:pPr>
+              <a:lnSpc>
+                <a:spcPct val="100000"/>
+              </a:lnSpc>
+            </a:pPr>
+            <a:r>
+              <a:rPr b="0" lang="pt-BR" sz="1500" spc="-1" strike="noStrike">
+                <a:solidFill>
+                  <a:srgbClr val="000000"/>
+                </a:solidFill>
+                <a:latin typeface="Arial"/>
+                <a:ea typeface="DejaVu Sans"/>
+              </a:rPr>
+              <a:t>Qual o seu CPF?</a:t>
+            </a:r>
+            <a:endParaRPr b="0" lang="pt-BR" sz="1500" spc="-1" strike="noStrike">
+              <a:solidFill>
+                <a:srgbClr val="000000"/>
+              </a:solidFill>
+              <a:latin typeface="Arial"/>
+            </a:endParaRPr>
+          </a:p>
+        </p:txBody>
+      </p:sp>
+      <p:sp>
+        <p:nvSpPr>
+          <p:cNvPr id="86" name=""/>
+          <p:cNvSpPr/>
+          <p:nvPr/>
+        </p:nvSpPr>
+        <p:spPr>
+          <a:xfrm>
+            <a:off x="11969280" y="2313000"/>
+            <a:ext cx="360" cy="684360"/>
+          </a:xfrm>
+          <a:prstGeom prst="line">
+            <a:avLst/>
+          </a:prstGeom>
+          <a:ln w="108000">
+            <a:solidFill>
+              <a:srgbClr val="3465a4"/>
+            </a:solidFill>
+            <a:round/>
+            <a:tailEnd len="med" type="triangle" w="med"/>
+          </a:ln>
+        </p:spPr>
+        <p:style>
+          <a:lnRef idx="0"/>
+          <a:fillRef idx="0"/>
+          <a:effectRef idx="0"/>
+          <a:fontRef idx="minor"/>
+        </p:style>
+        <p:txBody>
+          <a:bodyPr lIns="144000" rIns="144000" tIns="99000" bIns="99000" anchor="ctr">
+            <a:noAutofit/>
+          </a:bodyPr>
+          <a:p>
+            <a:endParaRPr b="0" lang="pt-BR" sz="1800" spc="-1" strike="noStrike">
+              <a:solidFill>
+                <a:srgbClr val="000000"/>
+              </a:solidFill>
+              <a:latin typeface="Arial"/>
+              <a:ea typeface="DejaVu Sans"/>
+            </a:endParaRPr>
+          </a:p>
+        </p:txBody>
+      </p:sp>
+      <p:sp>
+        <p:nvSpPr>
+          <p:cNvPr id="87" name=""/>
+          <p:cNvSpPr/>
+          <p:nvPr/>
+        </p:nvSpPr>
+        <p:spPr>
+          <a:xfrm>
+            <a:off x="5256000" y="792000"/>
+            <a:ext cx="720000" cy="360"/>
+          </a:xfrm>
+          <a:prstGeom prst="line">
+            <a:avLst/>
+          </a:prstGeom>
+          <a:ln w="108000">
+            <a:solidFill>
+              <a:srgbClr val="3465a4"/>
+            </a:solidFill>
+            <a:round/>
+            <a:tailEnd len="med" type="triangle" w="med"/>
+          </a:ln>
+        </p:spPr>
+        <p:style>
+          <a:lnRef idx="0"/>
+          <a:fillRef idx="0"/>
+          <a:effectRef idx="0"/>
+          <a:fontRef idx="minor"/>
+        </p:style>
+        <p:txBody>
+          <a:bodyPr lIns="144000" rIns="144000" tIns="-99000" bIns="-99000" anchor="ctr">
+            <a:noAutofit/>
+          </a:bodyPr>
+          <a:p>
+            <a:endParaRPr b="0" lang="pt-BR" sz="1800" spc="-1" strike="noStrike">
+              <a:solidFill>
+                <a:srgbClr val="000000"/>
+              </a:solidFill>
+              <a:latin typeface="Arial"/>
+              <a:ea typeface="DejaVu Sans"/>
+            </a:endParaRPr>
+          </a:p>
+        </p:txBody>
+      </p:sp>
+      <p:sp>
+        <p:nvSpPr>
+          <p:cNvPr id="88" name=""/>
+          <p:cNvSpPr/>
+          <p:nvPr/>
+        </p:nvSpPr>
+        <p:spPr>
+          <a:xfrm>
+            <a:off x="6056640" y="432000"/>
+            <a:ext cx="1214280" cy="718920"/>
+          </a:xfrm>
+          <a:prstGeom prst="rect">
+            <a:avLst/>
+          </a:prstGeom>
+          <a:noFill/>
+          <a:ln w="0">
+            <a:noFill/>
+          </a:ln>
+        </p:spPr>
+        <p:style>
+          <a:lnRef idx="0"/>
+          <a:fillRef idx="0"/>
+          <a:effectRef idx="0"/>
+          <a:fontRef idx="minor"/>
+        </p:style>
+        <p:txBody>
+          <a:bodyPr lIns="90000" rIns="90000" tIns="45000" bIns="45000" anchor="ctr">
+            <a:noAutofit/>
+          </a:bodyPr>
+          <a:p>
+            <a:pPr>
+              <a:lnSpc>
+                <a:spcPct val="100000"/>
+              </a:lnSpc>
+            </a:pPr>
+            <a:r>
+              <a:rPr b="0" lang="pt-BR" sz="1500" spc="-1" strike="noStrike">
+                <a:solidFill>
+                  <a:srgbClr val="000000"/>
+                </a:solidFill>
+                <a:latin typeface="Arial"/>
+                <a:ea typeface="DejaVu Sans"/>
+              </a:rPr>
+              <a:t>Qual o seu endereço</a:t>
+            </a:r>
+            <a:endParaRPr b="0" lang="pt-BR" sz="1500" spc="-1" strike="noStrike">
+              <a:solidFill>
+                <a:srgbClr val="000000"/>
+              </a:solidFill>
+              <a:latin typeface="Arial"/>
+            </a:endParaRPr>
+          </a:p>
+        </p:txBody>
+      </p:sp>
+      <p:sp>
+        <p:nvSpPr>
+          <p:cNvPr id="89" name=""/>
+          <p:cNvSpPr/>
+          <p:nvPr/>
+        </p:nvSpPr>
+        <p:spPr>
+          <a:xfrm>
+            <a:off x="9360000" y="756000"/>
+            <a:ext cx="900000" cy="360"/>
+          </a:xfrm>
+          <a:prstGeom prst="line">
+            <a:avLst/>
+          </a:prstGeom>
+          <a:ln w="108000">
+            <a:solidFill>
+              <a:srgbClr val="3465a4"/>
+            </a:solidFill>
+            <a:round/>
+            <a:tailEnd len="med" type="triangle" w="med"/>
+          </a:ln>
+        </p:spPr>
+        <p:style>
+          <a:lnRef idx="0"/>
+          <a:fillRef idx="0"/>
+          <a:effectRef idx="0"/>
+          <a:fontRef idx="minor"/>
+        </p:style>
+        <p:txBody>
+          <a:bodyPr lIns="144000" rIns="144000" tIns="-99000" bIns="-99000" anchor="ctr">
+            <a:noAutofit/>
+          </a:bodyPr>
+          <a:p>
+            <a:endParaRPr b="0" lang="pt-BR" sz="1800" spc="-1" strike="noStrike">
+              <a:solidFill>
+                <a:srgbClr val="000000"/>
+              </a:solidFill>
+              <a:latin typeface="Arial"/>
+              <a:ea typeface="DejaVu Sans"/>
+            </a:endParaRPr>
+          </a:p>
+        </p:txBody>
+      </p:sp>
+      <p:sp>
+        <p:nvSpPr>
+          <p:cNvPr id="90" name=""/>
+          <p:cNvSpPr/>
+          <p:nvPr/>
+        </p:nvSpPr>
+        <p:spPr>
+          <a:xfrm>
+            <a:off x="7200000" y="792000"/>
+            <a:ext cx="720000" cy="360"/>
+          </a:xfrm>
+          <a:prstGeom prst="line">
+            <a:avLst/>
+          </a:prstGeom>
+          <a:ln w="108000">
+            <a:solidFill>
+              <a:srgbClr val="3465a4"/>
+            </a:solidFill>
+            <a:round/>
+            <a:tailEnd len="med" type="triangle" w="med"/>
+          </a:ln>
+        </p:spPr>
+        <p:style>
+          <a:lnRef idx="0"/>
+          <a:fillRef idx="0"/>
+          <a:effectRef idx="0"/>
+          <a:fontRef idx="minor"/>
+        </p:style>
+        <p:txBody>
+          <a:bodyPr lIns="144000" rIns="144000" tIns="-99000" bIns="-99000" anchor="ctr">
+            <a:noAutofit/>
+          </a:bodyPr>
+          <a:p>
+            <a:endParaRPr b="0" lang="pt-BR" sz="1800" spc="-1" strike="noStrike">
+              <a:solidFill>
+                <a:srgbClr val="000000"/>
+              </a:solidFill>
+              <a:latin typeface="Arial"/>
+              <a:ea typeface="DejaVu Sans"/>
+            </a:endParaRPr>
+          </a:p>
+        </p:txBody>
+      </p:sp>
+      <p:sp>
+        <p:nvSpPr>
+          <p:cNvPr id="91" name=""/>
+          <p:cNvSpPr/>
+          <p:nvPr/>
+        </p:nvSpPr>
+        <p:spPr>
+          <a:xfrm>
+            <a:off x="7992000" y="432000"/>
+            <a:ext cx="1214280" cy="718920"/>
+          </a:xfrm>
+          <a:prstGeom prst="rect">
+            <a:avLst/>
+          </a:prstGeom>
+          <a:noFill/>
+          <a:ln w="0">
+            <a:noFill/>
+          </a:ln>
+        </p:spPr>
+        <p:style>
+          <a:lnRef idx="0"/>
+          <a:fillRef idx="0"/>
+          <a:effectRef idx="0"/>
+          <a:fontRef idx="minor"/>
+        </p:style>
+        <p:txBody>
+          <a:bodyPr lIns="90000" rIns="90000" tIns="45000" bIns="45000" anchor="ctr">
+            <a:noAutofit/>
+          </a:bodyPr>
+          <a:p>
+            <a:pPr>
+              <a:lnSpc>
+                <a:spcPct val="100000"/>
+              </a:lnSpc>
+            </a:pPr>
+            <a:r>
+              <a:rPr b="0" lang="pt-BR" sz="1500" spc="-1" strike="noStrike">
+                <a:solidFill>
+                  <a:srgbClr val="000000"/>
+                </a:solidFill>
+                <a:latin typeface="Arial"/>
+                <a:ea typeface="DejaVu Sans"/>
+              </a:rPr>
+              <a:t>Você tem um carro? </a:t>
             </a:r>
             <a:endParaRPr b="0" lang="pt-BR" sz="1500" spc="-1" strike="noStrike">
               <a:solidFill>

</xml_diff>